<commit_message>
Desribe how to use ss_conductor on op container
</commit_message>
<xml_diff>
--- a/StarSeeker/operator/img/ss_conductor.pptx
+++ b/StarSeeker/operator/img/ss_conductor.pptx
@@ -7873,6 +7873,102 @@
           </a:p>
         </p:txBody>
       </p:sp>
+      <p:cxnSp>
+        <p:nvCxnSpPr>
+          <p:cNvPr id="78" name="直線コネクタ 77">
+            <a:extLst>
+              <a:ext uri="{FF2B5EF4-FFF2-40B4-BE49-F238E27FC236}">
+                <a16:creationId xmlns:a16="http://schemas.microsoft.com/office/drawing/2014/main" id="{9FD9ABAB-4CEE-455C-B978-8819AB607FC8}"/>
+              </a:ext>
+            </a:extLst>
+          </p:cNvPr>
+          <p:cNvCxnSpPr>
+            <a:cxnSpLocks/>
+            <a:stCxn id="76" idx="3"/>
+            <a:endCxn id="75" idx="1"/>
+          </p:cNvCxnSpPr>
+          <p:nvPr/>
+        </p:nvCxnSpPr>
+        <p:spPr>
+          <a:xfrm>
+            <a:off x="1787005" y="1610798"/>
+            <a:ext cx="1428675" cy="3276364"/>
+          </a:xfrm>
+          <a:prstGeom prst="line">
+            <a:avLst/>
+          </a:prstGeom>
+          <a:ln w="19050">
+            <a:solidFill>
+              <a:schemeClr val="tx1"/>
+            </a:solidFill>
+            <a:prstDash val="sysDash"/>
+            <a:headEnd type="none" w="med" len="med"/>
+            <a:tailEnd type="triangle" w="med" len="med"/>
+          </a:ln>
+        </p:spPr>
+        <p:style>
+          <a:lnRef idx="1">
+            <a:schemeClr val="accent1"/>
+          </a:lnRef>
+          <a:fillRef idx="0">
+            <a:schemeClr val="accent1"/>
+          </a:fillRef>
+          <a:effectRef idx="0">
+            <a:schemeClr val="accent1"/>
+          </a:effectRef>
+          <a:fontRef idx="minor">
+            <a:schemeClr val="tx1"/>
+          </a:fontRef>
+        </p:style>
+      </p:cxnSp>
+      <p:cxnSp>
+        <p:nvCxnSpPr>
+          <p:cNvPr id="87" name="直線コネクタ 86">
+            <a:extLst>
+              <a:ext uri="{FF2B5EF4-FFF2-40B4-BE49-F238E27FC236}">
+                <a16:creationId xmlns:a16="http://schemas.microsoft.com/office/drawing/2014/main" id="{C14A1AC9-206A-46B4-851A-DF3C0506B50A}"/>
+              </a:ext>
+            </a:extLst>
+          </p:cNvPr>
+          <p:cNvCxnSpPr>
+            <a:cxnSpLocks/>
+            <a:stCxn id="76" idx="3"/>
+            <a:endCxn id="202" idx="1"/>
+          </p:cNvCxnSpPr>
+          <p:nvPr/>
+        </p:nvCxnSpPr>
+        <p:spPr>
+          <a:xfrm>
+            <a:off x="1787005" y="1610798"/>
+            <a:ext cx="1428675" cy="3852428"/>
+          </a:xfrm>
+          <a:prstGeom prst="line">
+            <a:avLst/>
+          </a:prstGeom>
+          <a:ln w="19050">
+            <a:solidFill>
+              <a:schemeClr val="tx1"/>
+            </a:solidFill>
+            <a:prstDash val="sysDash"/>
+            <a:headEnd type="none" w="med" len="med"/>
+            <a:tailEnd type="triangle" w="med" len="med"/>
+          </a:ln>
+        </p:spPr>
+        <p:style>
+          <a:lnRef idx="1">
+            <a:schemeClr val="accent1"/>
+          </a:lnRef>
+          <a:fillRef idx="0">
+            <a:schemeClr val="accent1"/>
+          </a:fillRef>
+          <a:effectRef idx="0">
+            <a:schemeClr val="accent1"/>
+          </a:effectRef>
+          <a:fontRef idx="minor">
+            <a:schemeClr val="tx1"/>
+          </a:fontRef>
+        </p:style>
+      </p:cxnSp>
     </p:spTree>
     <p:extLst>
       <p:ext uri="{BB962C8B-B14F-4D97-AF65-F5344CB8AC3E}">

</xml_diff>